<commit_message>
Updates, especially ex TP
</commit_message>
<xml_diff>
--- a/TalkatFI2019.pptx
+++ b/TalkatFI2019.pptx
@@ -11,8 +11,12 @@
     <p:sldId id="272" r:id="rId5"/>
     <p:sldId id="275" r:id="rId6"/>
     <p:sldId id="273" r:id="rId7"/>
-    <p:sldId id="270" r:id="rId8"/>
-    <p:sldId id="274" r:id="rId9"/>
+    <p:sldId id="278" r:id="rId8"/>
+    <p:sldId id="279" r:id="rId9"/>
+    <p:sldId id="280" r:id="rId10"/>
+    <p:sldId id="270" r:id="rId11"/>
+    <p:sldId id="274" r:id="rId12"/>
+    <p:sldId id="277" r:id="rId13"/>
   </p:sldIdLst>
   <p:sldSz cx="9144000" cy="6858000" type="screen4x3"/>
   <p:notesSz cx="6858000" cy="9144000"/>
@@ -3387,6 +3391,682 @@
 </p:sld>
 </file>
 
+<file path=ppt/slides/slide10.xml><?xml version="1.0" encoding="utf-8"?>
+<p:sld xmlns:a="http://schemas.openxmlformats.org/drawingml/2006/main" xmlns:r="http://schemas.openxmlformats.org/officeDocument/2006/relationships" xmlns:p="http://schemas.openxmlformats.org/presentationml/2006/main">
+  <p:cSld>
+    <p:spTree>
+      <p:nvGrpSpPr>
+        <p:cNvPr id="1" name=""/>
+        <p:cNvGrpSpPr/>
+        <p:nvPr/>
+      </p:nvGrpSpPr>
+      <p:grpSpPr>
+        <a:xfrm>
+          <a:off x="0" y="0"/>
+          <a:ext cx="0" cy="0"/>
+          <a:chOff x="0" y="0"/>
+          <a:chExt cx="0" cy="0"/>
+        </a:xfrm>
+      </p:grpSpPr>
+      <p:grpSp>
+        <p:nvGrpSpPr>
+          <p:cNvPr id="2" name="Group 1"/>
+          <p:cNvGrpSpPr/>
+          <p:nvPr/>
+        </p:nvGrpSpPr>
+        <p:grpSpPr>
+          <a:xfrm>
+            <a:off x="0" y="456913"/>
+            <a:ext cx="8876764" cy="453980"/>
+            <a:chOff x="-115910" y="386367"/>
+            <a:chExt cx="11835685" cy="605307"/>
+          </a:xfrm>
+          <a:solidFill>
+            <a:srgbClr val="0C2738"/>
+          </a:solidFill>
+        </p:grpSpPr>
+        <p:sp>
+          <p:nvSpPr>
+            <p:cNvPr id="3" name="Round Single Corner Rectangle 2"/>
+            <p:cNvSpPr/>
+            <p:nvPr/>
+          </p:nvSpPr>
+          <p:spPr>
+            <a:xfrm>
+              <a:off x="-115910" y="386367"/>
+              <a:ext cx="11835685" cy="605307"/>
+            </a:xfrm>
+            <a:prstGeom prst="round1Rect">
+              <a:avLst/>
+            </a:prstGeom>
+            <a:grpFill/>
+            <a:ln>
+              <a:noFill/>
+            </a:ln>
+          </p:spPr>
+          <p:style>
+            <a:lnRef idx="2">
+              <a:schemeClr val="accent1">
+                <a:shade val="50000"/>
+              </a:schemeClr>
+            </a:lnRef>
+            <a:fillRef idx="1">
+              <a:schemeClr val="accent1"/>
+            </a:fillRef>
+            <a:effectRef idx="0">
+              <a:schemeClr val="accent1"/>
+            </a:effectRef>
+            <a:fontRef idx="minor">
+              <a:schemeClr val="lt1"/>
+            </a:fontRef>
+          </p:style>
+          <p:txBody>
+            <a:bodyPr rtlCol="0" anchor="ctr"/>
+            <a:lstStyle/>
+            <a:p>
+              <a:pPr algn="ctr"/>
+              <a:endParaRPr lang="en-GB" sz="1350"/>
+            </a:p>
+          </p:txBody>
+        </p:sp>
+        <p:pic>
+          <p:nvPicPr>
+            <p:cNvPr id="4" name="Picture 3"/>
+            <p:cNvPicPr>
+              <a:picLocks noChangeAspect="1"/>
+            </p:cNvPicPr>
+            <p:nvPr/>
+          </p:nvPicPr>
+          <p:blipFill>
+            <a:blip r:embed="rId2" cstate="print">
+              <a:extLst>
+                <a:ext uri="{28A0092B-C50C-407E-A947-70E740481C1C}">
+                  <a14:useLocalDpi xmlns:a14="http://schemas.microsoft.com/office/drawing/2010/main" val="0"/>
+                </a:ext>
+              </a:extLst>
+            </a:blip>
+            <a:stretch>
+              <a:fillRect/>
+            </a:stretch>
+          </p:blipFill>
+          <p:spPr>
+            <a:xfrm>
+              <a:off x="9710730" y="425004"/>
+              <a:ext cx="1918893" cy="496430"/>
+            </a:xfrm>
+            <a:prstGeom prst="rect">
+              <a:avLst/>
+            </a:prstGeom>
+            <a:grpFill/>
+          </p:spPr>
+        </p:pic>
+      </p:grpSp>
+      <p:sp>
+        <p:nvSpPr>
+          <p:cNvPr id="5" name="Rectangle 4"/>
+          <p:cNvSpPr/>
+          <p:nvPr/>
+        </p:nvSpPr>
+        <p:spPr>
+          <a:xfrm>
+            <a:off x="3141343" y="2676798"/>
+            <a:ext cx="2917786" cy="553998"/>
+          </a:xfrm>
+          <a:prstGeom prst="rect">
+            <a:avLst/>
+          </a:prstGeom>
+        </p:spPr>
+        <p:txBody>
+          <a:bodyPr wrap="none">
+            <a:spAutoFit/>
+          </a:bodyPr>
+          <a:lstStyle/>
+          <a:p>
+            <a:r>
+              <a:rPr lang="en-GB" sz="3000" dirty="0">
+                <a:solidFill>
+                  <a:srgbClr val="000000"/>
+                </a:solidFill>
+                <a:latin typeface="Arial" panose="020B0604020202020204" pitchFamily="34" charset="0"/>
+                <a:ea typeface="Calibri" panose="020F0502020204030204" pitchFamily="34" charset="0"/>
+                <a:cs typeface="Arial" panose="020B0604020202020204" pitchFamily="34" charset="0"/>
+              </a:rPr>
+              <a:t>Any questions? </a:t>
+            </a:r>
+            <a:endParaRPr lang="en-GB" sz="3000" dirty="0">
+              <a:latin typeface="Arial" panose="020B0604020202020204" pitchFamily="34" charset="0"/>
+              <a:ea typeface="Calibri" panose="020F0502020204030204" pitchFamily="34" charset="0"/>
+              <a:cs typeface="Arial" panose="020B0604020202020204" pitchFamily="34" charset="0"/>
+            </a:endParaRPr>
+          </a:p>
+        </p:txBody>
+      </p:sp>
+      <p:pic>
+        <p:nvPicPr>
+          <p:cNvPr id="6" name="Picture 5"/>
+          <p:cNvPicPr>
+            <a:picLocks noChangeAspect="1"/>
+          </p:cNvPicPr>
+          <p:nvPr/>
+        </p:nvPicPr>
+        <p:blipFill>
+          <a:blip r:embed="rId3">
+            <a:extLst>
+              <a:ext uri="{28A0092B-C50C-407E-A947-70E740481C1C}">
+                <a14:useLocalDpi xmlns:a14="http://schemas.microsoft.com/office/drawing/2010/main" val="0"/>
+              </a:ext>
+            </a:extLst>
+          </a:blip>
+          <a:stretch>
+            <a:fillRect/>
+          </a:stretch>
+        </p:blipFill>
+        <p:spPr>
+          <a:xfrm>
+            <a:off x="528576" y="5560005"/>
+            <a:ext cx="2197372" cy="843742"/>
+          </a:xfrm>
+          <a:prstGeom prst="rect">
+            <a:avLst/>
+          </a:prstGeom>
+        </p:spPr>
+      </p:pic>
+      <p:pic>
+        <p:nvPicPr>
+          <p:cNvPr id="7" name="Picture 6"/>
+          <p:cNvPicPr>
+            <a:picLocks noChangeAspect="1"/>
+          </p:cNvPicPr>
+          <p:nvPr/>
+        </p:nvPicPr>
+        <p:blipFill>
+          <a:blip r:embed="rId4"/>
+          <a:stretch>
+            <a:fillRect/>
+          </a:stretch>
+        </p:blipFill>
+        <p:spPr>
+          <a:xfrm>
+            <a:off x="5830206" y="5606682"/>
+            <a:ext cx="2615054" cy="871684"/>
+          </a:xfrm>
+          <a:prstGeom prst="rect">
+            <a:avLst/>
+          </a:prstGeom>
+        </p:spPr>
+      </p:pic>
+    </p:spTree>
+    <p:extLst>
+      <p:ext uri="{BB962C8B-B14F-4D97-AF65-F5344CB8AC3E}">
+        <p14:creationId xmlns:p14="http://schemas.microsoft.com/office/powerpoint/2010/main" val="1884598785"/>
+      </p:ext>
+    </p:extLst>
+  </p:cSld>
+  <p:clrMapOvr>
+    <a:masterClrMapping/>
+  </p:clrMapOvr>
+</p:sld>
+</file>
+
+<file path=ppt/slides/slide11.xml><?xml version="1.0" encoding="utf-8"?>
+<p:sld xmlns:a="http://schemas.openxmlformats.org/drawingml/2006/main" xmlns:r="http://schemas.openxmlformats.org/officeDocument/2006/relationships" xmlns:p="http://schemas.openxmlformats.org/presentationml/2006/main">
+  <p:cSld>
+    <p:spTree>
+      <p:nvGrpSpPr>
+        <p:cNvPr id="1" name=""/>
+        <p:cNvGrpSpPr/>
+        <p:nvPr/>
+      </p:nvGrpSpPr>
+      <p:grpSpPr>
+        <a:xfrm>
+          <a:off x="0" y="0"/>
+          <a:ext cx="0" cy="0"/>
+          <a:chOff x="0" y="0"/>
+          <a:chExt cx="0" cy="0"/>
+        </a:xfrm>
+      </p:grpSpPr>
+      <p:grpSp>
+        <p:nvGrpSpPr>
+          <p:cNvPr id="2" name="Group 1"/>
+          <p:cNvGrpSpPr/>
+          <p:nvPr/>
+        </p:nvGrpSpPr>
+        <p:grpSpPr>
+          <a:xfrm>
+            <a:off x="60385" y="448286"/>
+            <a:ext cx="8876764" cy="453980"/>
+            <a:chOff x="-115910" y="386367"/>
+            <a:chExt cx="11835685" cy="605307"/>
+          </a:xfrm>
+          <a:solidFill>
+            <a:srgbClr val="0C2738"/>
+          </a:solidFill>
+        </p:grpSpPr>
+        <p:sp>
+          <p:nvSpPr>
+            <p:cNvPr id="3" name="Round Single Corner Rectangle 2"/>
+            <p:cNvSpPr/>
+            <p:nvPr/>
+          </p:nvSpPr>
+          <p:spPr>
+            <a:xfrm>
+              <a:off x="-115910" y="386367"/>
+              <a:ext cx="11835685" cy="605307"/>
+            </a:xfrm>
+            <a:prstGeom prst="round1Rect">
+              <a:avLst/>
+            </a:prstGeom>
+            <a:grpFill/>
+            <a:ln>
+              <a:noFill/>
+            </a:ln>
+          </p:spPr>
+          <p:style>
+            <a:lnRef idx="2">
+              <a:schemeClr val="accent1">
+                <a:shade val="50000"/>
+              </a:schemeClr>
+            </a:lnRef>
+            <a:fillRef idx="1">
+              <a:schemeClr val="accent1"/>
+            </a:fillRef>
+            <a:effectRef idx="0">
+              <a:schemeClr val="accent1"/>
+            </a:effectRef>
+            <a:fontRef idx="minor">
+              <a:schemeClr val="lt1"/>
+            </a:fontRef>
+          </p:style>
+          <p:txBody>
+            <a:bodyPr rtlCol="0" anchor="ctr"/>
+            <a:lstStyle/>
+            <a:p>
+              <a:pPr algn="ctr"/>
+              <a:endParaRPr lang="en-GB" sz="1350"/>
+            </a:p>
+          </p:txBody>
+        </p:sp>
+        <p:pic>
+          <p:nvPicPr>
+            <p:cNvPr id="4" name="Picture 3"/>
+            <p:cNvPicPr>
+              <a:picLocks noChangeAspect="1"/>
+            </p:cNvPicPr>
+            <p:nvPr/>
+          </p:nvPicPr>
+          <p:blipFill>
+            <a:blip r:embed="rId2" cstate="print">
+              <a:extLst>
+                <a:ext uri="{28A0092B-C50C-407E-A947-70E740481C1C}">
+                  <a14:useLocalDpi xmlns:a14="http://schemas.microsoft.com/office/drawing/2010/main" val="0"/>
+                </a:ext>
+              </a:extLst>
+            </a:blip>
+            <a:stretch>
+              <a:fillRect/>
+            </a:stretch>
+          </p:blipFill>
+          <p:spPr>
+            <a:xfrm>
+              <a:off x="9710730" y="425004"/>
+              <a:ext cx="1918893" cy="496430"/>
+            </a:xfrm>
+            <a:prstGeom prst="rect">
+              <a:avLst/>
+            </a:prstGeom>
+            <a:grpFill/>
+          </p:spPr>
+        </p:pic>
+      </p:grpSp>
+      <p:sp>
+        <p:nvSpPr>
+          <p:cNvPr id="5" name="Title 4">
+            <a:extLst>
+              <a:ext uri="{FF2B5EF4-FFF2-40B4-BE49-F238E27FC236}">
+                <a16:creationId xmlns:a16="http://schemas.microsoft.com/office/drawing/2014/main" id="{08C64A66-0920-4768-9C91-A9A7C4A806F1}"/>
+              </a:ext>
+            </a:extLst>
+          </p:cNvPr>
+          <p:cNvSpPr>
+            <a:spLocks noGrp="1"/>
+          </p:cNvSpPr>
+          <p:nvPr>
+            <p:ph type="title"/>
+          </p:nvPr>
+        </p:nvSpPr>
+        <p:spPr>
+          <a:xfrm>
+            <a:off x="628650" y="365126"/>
+            <a:ext cx="7886700" cy="692150"/>
+          </a:xfrm>
+        </p:spPr>
+        <p:txBody>
+          <a:bodyPr>
+            <a:normAutofit fontScale="90000"/>
+          </a:bodyPr>
+          <a:lstStyle/>
+          <a:p>
+            <a:r>
+              <a:rPr lang="en-GB" dirty="0">
+                <a:solidFill>
+                  <a:schemeClr val="bg1"/>
+                </a:solidFill>
+              </a:rPr>
+              <a:t>References</a:t>
+            </a:r>
+          </a:p>
+        </p:txBody>
+      </p:sp>
+      <p:sp>
+        <p:nvSpPr>
+          <p:cNvPr id="6" name="Content Placeholder 5">
+            <a:extLst>
+              <a:ext uri="{FF2B5EF4-FFF2-40B4-BE49-F238E27FC236}">
+                <a16:creationId xmlns:a16="http://schemas.microsoft.com/office/drawing/2014/main" id="{B6D5D2CF-4CAE-4C0A-851A-3F7AD59C7EF2}"/>
+              </a:ext>
+            </a:extLst>
+          </p:cNvPr>
+          <p:cNvSpPr>
+            <a:spLocks noGrp="1"/>
+          </p:cNvSpPr>
+          <p:nvPr>
+            <p:ph idx="1"/>
+          </p:nvPr>
+        </p:nvSpPr>
+        <p:spPr>
+          <a:xfrm>
+            <a:off x="628650" y="985426"/>
+            <a:ext cx="7886700" cy="5191537"/>
+          </a:xfrm>
+        </p:spPr>
+        <p:txBody>
+          <a:bodyPr>
+            <a:noAutofit/>
+          </a:bodyPr>
+          <a:lstStyle/>
+          <a:p>
+            <a:pPr marL="0" indent="0">
+              <a:buNone/>
+            </a:pPr>
+            <a:r>
+              <a:rPr lang="en-GB" sz="2000" dirty="0"/>
+              <a:t>[1] Cynthia Taylor and </a:t>
+            </a:r>
+            <a:r>
+              <a:rPr lang="en-GB" sz="2000" dirty="0" err="1"/>
+              <a:t>Saheel</a:t>
+            </a:r>
+            <a:r>
+              <a:rPr lang="en-GB" sz="2000" dirty="0"/>
+              <a:t> </a:t>
+            </a:r>
+            <a:r>
+              <a:rPr lang="en-GB" sz="2000" dirty="0" err="1"/>
+              <a:t>Sakharkar</a:t>
+            </a:r>
+            <a:r>
+              <a:rPr lang="en-GB" sz="2000" dirty="0"/>
+              <a:t>. ';DROP TABLE textbooks; ― An Argument for SQL Injection Coverage in Database Textbooks. In Proc. of SIGCSE 2019, pages 191-197, 2019.</a:t>
+            </a:r>
+          </a:p>
+          <a:p>
+            <a:pPr marL="0" indent="0">
+              <a:buNone/>
+            </a:pPr>
+            <a:r>
+              <a:rPr lang="en-GB" sz="2000" dirty="0"/>
+              <a:t>[2] N. Meng, S. Nagy, D. Yao, W. Zhuang, and G. Arango </a:t>
+            </a:r>
+            <a:r>
+              <a:rPr lang="en-GB" sz="2000" dirty="0" err="1"/>
+              <a:t>Argoty</a:t>
+            </a:r>
+            <a:r>
+              <a:rPr lang="en-GB" sz="2000" dirty="0"/>
+              <a:t>. Secure coding practices in Java: Challenges and vulnerabilities. In IEEE/ACM 40th Int. Conf. on Software Engineering, pages 372-383, 2018.</a:t>
+            </a:r>
+          </a:p>
+          <a:p>
+            <a:pPr marL="0" indent="0">
+              <a:buNone/>
+            </a:pPr>
+            <a:r>
+              <a:rPr lang="en-GB" sz="2000" dirty="0"/>
+              <a:t>[3] F. Fischer, K. </a:t>
+            </a:r>
+            <a:r>
+              <a:rPr lang="en-GB" sz="2000" dirty="0" err="1"/>
+              <a:t>Böttinger</a:t>
+            </a:r>
+            <a:r>
+              <a:rPr lang="en-GB" sz="2000" dirty="0"/>
+              <a:t>, H. Xiao, C. </a:t>
+            </a:r>
+            <a:r>
+              <a:rPr lang="en-GB" sz="2000" dirty="0" err="1"/>
+              <a:t>Stransky</a:t>
+            </a:r>
+            <a:r>
+              <a:rPr lang="en-GB" sz="2000" dirty="0"/>
+              <a:t>, Y. </a:t>
+            </a:r>
+            <a:r>
+              <a:rPr lang="en-GB" sz="2000" dirty="0" err="1"/>
+              <a:t>Acar</a:t>
+            </a:r>
+            <a:r>
+              <a:rPr lang="en-GB" sz="2000" dirty="0"/>
+              <a:t>, M. Backes, and S. </a:t>
+            </a:r>
+            <a:r>
+              <a:rPr lang="en-GB" sz="2000" dirty="0" err="1"/>
+              <a:t>Fahl</a:t>
+            </a:r>
+            <a:r>
+              <a:rPr lang="en-GB" sz="2000" dirty="0"/>
+              <a:t>. Stack Overflow Considered Harmful? The Impact of </a:t>
+            </a:r>
+            <a:r>
+              <a:rPr lang="en-GB" sz="2000" dirty="0" err="1"/>
+              <a:t>Copy&amp;Paste</a:t>
+            </a:r>
+            <a:r>
+              <a:rPr lang="en-GB" sz="2000" dirty="0"/>
+              <a:t> on Android Application Security. In 38th IEEE Symposium on Security and Privacy, pages 121-136, 2017.</a:t>
+            </a:r>
+          </a:p>
+          <a:p>
+            <a:pPr marL="0" indent="0">
+              <a:buNone/>
+            </a:pPr>
+            <a:r>
+              <a:rPr lang="en-GB" sz="2000" dirty="0"/>
+              <a:t>[4] T. Unruh, B. </a:t>
+            </a:r>
+            <a:r>
+              <a:rPr lang="en-GB" sz="2000" dirty="0" err="1"/>
+              <a:t>Shastry</a:t>
+            </a:r>
+            <a:r>
+              <a:rPr lang="en-GB" sz="2000" dirty="0"/>
+              <a:t>, M. </a:t>
+            </a:r>
+            <a:r>
+              <a:rPr lang="en-GB" sz="2000" dirty="0" err="1"/>
+              <a:t>Skoruppa</a:t>
+            </a:r>
+            <a:r>
+              <a:rPr lang="en-GB" sz="2000" dirty="0"/>
+              <a:t>, F. Maggi, K. </a:t>
+            </a:r>
+            <a:r>
+              <a:rPr lang="en-GB" sz="2000" dirty="0" err="1"/>
+              <a:t>Rieck</a:t>
+            </a:r>
+            <a:r>
+              <a:rPr lang="en-GB" sz="2000" dirty="0"/>
+              <a:t>, J.-P. Seifert, and F. Yamaguchi. Leveraging Flawed Tutorials for Seeding Large-Scale Web Vulnerability Discovery. In Proc. of 11th USENIX Workshop on Offensive Technologies (WOOT 2017), 2017.</a:t>
+            </a:r>
+          </a:p>
+          <a:p>
+            <a:pPr marL="0" indent="0">
+              <a:buNone/>
+            </a:pPr>
+            <a:r>
+              <a:rPr lang="en-GB" sz="2000" dirty="0"/>
+              <a:t>[5] Alastair Irons, Nick Savage, Carsten Maple, Adrian Davies, and Lyndsay Turley. Cybersecurity in CS Degrees</a:t>
+            </a:r>
+            <a:r>
+              <a:rPr lang="en-GB" sz="2000" i="1" dirty="0"/>
+              <a:t>. </a:t>
+            </a:r>
+            <a:r>
+              <a:rPr lang="en-GB" sz="2000" i="1" dirty="0" err="1"/>
+              <a:t>ITNow</a:t>
+            </a:r>
+            <a:r>
+              <a:rPr lang="en-GB" sz="2000" dirty="0"/>
+              <a:t>, 58:56-57, 2016.</a:t>
+            </a:r>
+          </a:p>
+        </p:txBody>
+      </p:sp>
+    </p:spTree>
+    <p:extLst>
+      <p:ext uri="{BB962C8B-B14F-4D97-AF65-F5344CB8AC3E}">
+        <p14:creationId xmlns:p14="http://schemas.microsoft.com/office/powerpoint/2010/main" val="118011086"/>
+      </p:ext>
+    </p:extLst>
+  </p:cSld>
+  <p:clrMapOvr>
+    <a:masterClrMapping/>
+  </p:clrMapOvr>
+</p:sld>
+</file>
+
+<file path=ppt/slides/slide12.xml><?xml version="1.0" encoding="utf-8"?>
+<p:sld xmlns:a="http://schemas.openxmlformats.org/drawingml/2006/main" xmlns:r="http://schemas.openxmlformats.org/officeDocument/2006/relationships" xmlns:p="http://schemas.openxmlformats.org/presentationml/2006/main">
+  <p:cSld>
+    <p:spTree>
+      <p:nvGrpSpPr>
+        <p:cNvPr id="1" name=""/>
+        <p:cNvGrpSpPr/>
+        <p:nvPr/>
+      </p:nvGrpSpPr>
+      <p:grpSpPr>
+        <a:xfrm>
+          <a:off x="0" y="0"/>
+          <a:ext cx="0" cy="0"/>
+          <a:chOff x="0" y="0"/>
+          <a:chExt cx="0" cy="0"/>
+        </a:xfrm>
+      </p:grpSpPr>
+      <p:grpSp>
+        <p:nvGrpSpPr>
+          <p:cNvPr id="2" name="Group 1"/>
+          <p:cNvGrpSpPr/>
+          <p:nvPr/>
+        </p:nvGrpSpPr>
+        <p:grpSpPr>
+          <a:xfrm>
+            <a:off x="60385" y="448286"/>
+            <a:ext cx="8876764" cy="453980"/>
+            <a:chOff x="-115910" y="386367"/>
+            <a:chExt cx="11835685" cy="605307"/>
+          </a:xfrm>
+          <a:solidFill>
+            <a:srgbClr val="0C2738"/>
+          </a:solidFill>
+        </p:grpSpPr>
+        <p:sp>
+          <p:nvSpPr>
+            <p:cNvPr id="3" name="Round Single Corner Rectangle 2"/>
+            <p:cNvSpPr/>
+            <p:nvPr/>
+          </p:nvSpPr>
+          <p:spPr>
+            <a:xfrm>
+              <a:off x="-115910" y="386367"/>
+              <a:ext cx="11835685" cy="605307"/>
+            </a:xfrm>
+            <a:prstGeom prst="round1Rect">
+              <a:avLst/>
+            </a:prstGeom>
+            <a:grpFill/>
+            <a:ln>
+              <a:noFill/>
+            </a:ln>
+          </p:spPr>
+          <p:style>
+            <a:lnRef idx="2">
+              <a:schemeClr val="accent1">
+                <a:shade val="50000"/>
+              </a:schemeClr>
+            </a:lnRef>
+            <a:fillRef idx="1">
+              <a:schemeClr val="accent1"/>
+            </a:fillRef>
+            <a:effectRef idx="0">
+              <a:schemeClr val="accent1"/>
+            </a:effectRef>
+            <a:fontRef idx="minor">
+              <a:schemeClr val="lt1"/>
+            </a:fontRef>
+          </p:style>
+          <p:txBody>
+            <a:bodyPr rtlCol="0" anchor="ctr"/>
+            <a:lstStyle/>
+            <a:p>
+              <a:pPr algn="ctr"/>
+              <a:endParaRPr lang="en-GB" sz="1350"/>
+            </a:p>
+          </p:txBody>
+        </p:sp>
+        <p:pic>
+          <p:nvPicPr>
+            <p:cNvPr id="4" name="Picture 3"/>
+            <p:cNvPicPr>
+              <a:picLocks noChangeAspect="1"/>
+            </p:cNvPicPr>
+            <p:nvPr/>
+          </p:nvPicPr>
+          <p:blipFill>
+            <a:blip r:embed="rId2" cstate="print">
+              <a:extLst>
+                <a:ext uri="{28A0092B-C50C-407E-A947-70E740481C1C}">
+                  <a14:useLocalDpi xmlns:a14="http://schemas.microsoft.com/office/drawing/2010/main" val="0"/>
+                </a:ext>
+              </a:extLst>
+            </a:blip>
+            <a:stretch>
+              <a:fillRect/>
+            </a:stretch>
+          </p:blipFill>
+          <p:spPr>
+            <a:xfrm>
+              <a:off x="9710730" y="425004"/>
+              <a:ext cx="1918893" cy="496430"/>
+            </a:xfrm>
+            <a:prstGeom prst="rect">
+              <a:avLst/>
+            </a:prstGeom>
+            <a:grpFill/>
+          </p:spPr>
+        </p:pic>
+      </p:grpSp>
+    </p:spTree>
+    <p:extLst>
+      <p:ext uri="{BB962C8B-B14F-4D97-AF65-F5344CB8AC3E}">
+        <p14:creationId xmlns:p14="http://schemas.microsoft.com/office/powerpoint/2010/main" val="3027297693"/>
+      </p:ext>
+    </p:extLst>
+  </p:cSld>
+  <p:clrMapOvr>
+    <a:masterClrMapping/>
+  </p:clrMapOvr>
+</p:sld>
+</file>
+
 <file path=ppt/slides/slide2.xml><?xml version="1.0" encoding="utf-8"?>
 <p:sld xmlns:a="http://schemas.openxmlformats.org/drawingml/2006/main" xmlns:r="http://schemas.openxmlformats.org/officeDocument/2006/relationships" xmlns:p="http://schemas.openxmlformats.org/presentationml/2006/main">
   <p:cSld>
@@ -3763,7 +4443,7 @@
         </p:nvGrpSpPr>
         <p:grpSpPr>
           <a:xfrm>
-            <a:off x="60385" y="448286"/>
+            <a:off x="60385" y="410186"/>
             <a:ext cx="8876764" cy="453980"/>
             <a:chOff x="-115910" y="386367"/>
             <a:chExt cx="11835685" cy="605307"/>
@@ -3914,7 +4594,7 @@
         <p:spPr/>
         <p:txBody>
           <a:bodyPr>
-            <a:normAutofit fontScale="92500"/>
+            <a:normAutofit fontScale="92500" lnSpcReduction="10000"/>
           </a:bodyPr>
           <a:lstStyle/>
           <a:p>
@@ -3973,7 +4653,7 @@
                 <a:ea typeface="Calibri" panose="020F0502020204030204" pitchFamily="34" charset="0"/>
                 <a:cs typeface="Arial" panose="020B0604020202020204" pitchFamily="34" charset="0"/>
               </a:rPr>
-              <a:t>X  fix bad design decisions (no framework to check for CSRF; unencrypted passwords etc.)</a:t>
+              <a:t>X  fix bad design decisions (no framework to check for CSRF; unencrypted passwords, logging in the wrong place [Facebook!] etc.)</a:t>
             </a:r>
           </a:p>
           <a:p>
@@ -4860,7 +5540,7 @@
                             </p:stCondLst>
                             <p:childTnLst>
                               <p:par>
-                                <p:cTn id="5" presetID="1" presetClass="entr" presetSubtype="0" fill="hold" nodeType="withEffect">
+                                <p:cTn id="5" presetID="1" presetClass="entr" presetSubtype="0" fill="hold" nodeType="afterEffect">
                                   <p:stCondLst>
                                     <p:cond delay="0"/>
                                   </p:stCondLst>
@@ -4890,15 +5570,24 @@
                                   </p:childTnLst>
                                 </p:cTn>
                               </p:par>
+                            </p:childTnLst>
+                          </p:cTn>
+                        </p:par>
+                        <p:par>
+                          <p:cTn id="7" fill="hold">
+                            <p:stCondLst>
+                              <p:cond delay="0"/>
+                            </p:stCondLst>
+                            <p:childTnLst>
                               <p:par>
-                                <p:cTn id="7" presetID="1" presetClass="entr" presetSubtype="0" fill="hold" nodeType="withEffect">
+                                <p:cTn id="8" presetID="1" presetClass="entr" presetSubtype="0" fill="hold" nodeType="afterEffect">
                                   <p:stCondLst>
                                     <p:cond delay="0"/>
                                   </p:stCondLst>
                                   <p:childTnLst>
                                     <p:set>
                                       <p:cBhvr>
-                                        <p:cTn id="8" dur="1" fill="hold">
+                                        <p:cTn id="9" dur="1" fill="hold">
                                           <p:stCondLst>
                                             <p:cond delay="0"/>
                                           </p:stCondLst>
@@ -4922,14 +5611,14 @@
                                 </p:cTn>
                               </p:par>
                               <p:par>
-                                <p:cTn id="9" presetID="1" presetClass="entr" presetSubtype="0" fill="hold" nodeType="withEffect">
+                                <p:cTn id="10" presetID="1" presetClass="entr" presetSubtype="0" fill="hold" nodeType="withEffect">
                                   <p:stCondLst>
                                     <p:cond delay="0"/>
                                   </p:stCondLst>
                                   <p:childTnLst>
                                     <p:set>
                                       <p:cBhvr>
-                                        <p:cTn id="10" dur="1" fill="hold">
+                                        <p:cTn id="11" dur="1" fill="hold">
                                           <p:stCondLst>
                                             <p:cond delay="0"/>
                                           </p:stCondLst>
@@ -5093,6 +5782,143 @@
           </p:spPr>
         </p:pic>
       </p:grpSp>
+      <p:sp>
+        <p:nvSpPr>
+          <p:cNvPr id="5" name="Title 4">
+            <a:extLst>
+              <a:ext uri="{FF2B5EF4-FFF2-40B4-BE49-F238E27FC236}">
+                <a16:creationId xmlns:a16="http://schemas.microsoft.com/office/drawing/2014/main" id="{BEF9321B-B6A0-4B3A-A7FB-4E079B1F9F0F}"/>
+              </a:ext>
+            </a:extLst>
+          </p:cNvPr>
+          <p:cNvSpPr>
+            <a:spLocks noGrp="1"/>
+          </p:cNvSpPr>
+          <p:nvPr>
+            <p:ph type="title"/>
+          </p:nvPr>
+        </p:nvSpPr>
+        <p:spPr>
+          <a:xfrm>
+            <a:off x="628650" y="365126"/>
+            <a:ext cx="7886700" cy="1196973"/>
+          </a:xfrm>
+        </p:spPr>
+        <p:txBody>
+          <a:bodyPr>
+            <a:normAutofit fontScale="90000"/>
+          </a:bodyPr>
+          <a:lstStyle/>
+          <a:p>
+            <a:r>
+              <a:rPr lang="en-GB" dirty="0">
+                <a:solidFill>
+                  <a:schemeClr val="bg1"/>
+                </a:solidFill>
+              </a:rPr>
+              <a:t>Informal Resources</a:t>
+            </a:r>
+            <a:br>
+              <a:rPr lang="en-GB" dirty="0">
+                <a:solidFill>
+                  <a:schemeClr val="bg1"/>
+                </a:solidFill>
+              </a:rPr>
+            </a:br>
+            <a:r>
+              <a:rPr lang="en-GB" dirty="0"/>
+              <a:t>such as </a:t>
+            </a:r>
+            <a:r>
+              <a:rPr lang="en-GB" dirty="0" err="1"/>
+              <a:t>StackOverflow</a:t>
+            </a:r>
+            <a:endParaRPr lang="en-GB" dirty="0">
+              <a:solidFill>
+                <a:schemeClr val="bg1"/>
+              </a:solidFill>
+            </a:endParaRPr>
+          </a:p>
+        </p:txBody>
+      </p:sp>
+      <p:sp>
+        <p:nvSpPr>
+          <p:cNvPr id="6" name="Content Placeholder 5">
+            <a:extLst>
+              <a:ext uri="{FF2B5EF4-FFF2-40B4-BE49-F238E27FC236}">
+                <a16:creationId xmlns:a16="http://schemas.microsoft.com/office/drawing/2014/main" id="{326F654D-8D44-4ABC-93C2-D6D3C223E1F1}"/>
+              </a:ext>
+            </a:extLst>
+          </p:cNvPr>
+          <p:cNvSpPr>
+            <a:spLocks noGrp="1"/>
+          </p:cNvSpPr>
+          <p:nvPr>
+            <p:ph idx="1"/>
+          </p:nvPr>
+        </p:nvSpPr>
+        <p:spPr/>
+        <p:txBody>
+          <a:bodyPr>
+            <a:normAutofit fontScale="92500" lnSpcReduction="10000"/>
+          </a:bodyPr>
+          <a:lstStyle/>
+          <a:p>
+            <a:r>
+              <a:rPr lang="en-GB" dirty="0"/>
+              <a:t>Focused on functionality and “getting it working”</a:t>
+            </a:r>
+          </a:p>
+          <a:p>
+            <a:r>
+              <a:rPr lang="en-GB" dirty="0"/>
+              <a:t>Consider Cross-Site Request Forgery (CSRF)</a:t>
+            </a:r>
+          </a:p>
+          <a:p>
+            <a:r>
+              <a:rPr lang="en-GB" dirty="0"/>
+              <a:t>By default, Spring protects against this</a:t>
+            </a:r>
+          </a:p>
+          <a:p>
+            <a:r>
+              <a:rPr lang="en-US" dirty="0"/>
+              <a:t>All the accepted answers to CSRF-related failures simply suggested disabling the check, with no comments on the downsides</a:t>
+            </a:r>
+          </a:p>
+          <a:p>
+            <a:r>
+              <a:rPr lang="en-US" dirty="0"/>
+              <a:t>[4] took top 30 tutorials (via Google)</a:t>
+            </a:r>
+          </a:p>
+          <a:p>
+            <a:r>
+              <a:rPr lang="en-US" dirty="0"/>
+              <a:t>6 had SQL Injection weaknesses, 3 CSRF</a:t>
+            </a:r>
+          </a:p>
+          <a:p>
+            <a:r>
+              <a:rPr lang="en-US" dirty="0"/>
+              <a:t>820 instances of these fragments on </a:t>
+            </a:r>
+            <a:r>
+              <a:rPr lang="en-US" dirty="0" err="1"/>
+              <a:t>Github</a:t>
+            </a:r>
+            <a:r>
+              <a:rPr lang="en-US" dirty="0"/>
+              <a:t>, of which 117 were verified manually </a:t>
+            </a:r>
+            <a:r>
+              <a:rPr lang="en-GB" dirty="0"/>
+              <a:t>to be vulnerable</a:t>
+            </a:r>
+          </a:p>
+        </p:txBody>
+      </p:sp>
     </p:spTree>
     <p:extLst>
       <p:ext uri="{BB962C8B-B14F-4D97-AF65-F5344CB8AC3E}">
@@ -5131,7 +5957,7 @@
         </p:nvGrpSpPr>
         <p:grpSpPr>
           <a:xfrm>
-            <a:off x="0" y="456913"/>
+            <a:off x="60385" y="448286"/>
             <a:ext cx="8876764" cy="453980"/>
             <a:chOff x="-115910" y="386367"/>
             <a:chExt cx="11835685" cy="605307"/>
@@ -5218,92 +6044,80 @@
       </p:grpSp>
       <p:sp>
         <p:nvSpPr>
-          <p:cNvPr id="5" name="Rectangle 4"/>
-          <p:cNvSpPr/>
-          <p:nvPr/>
+          <p:cNvPr id="5" name="Title 4">
+            <a:extLst>
+              <a:ext uri="{FF2B5EF4-FFF2-40B4-BE49-F238E27FC236}">
+                <a16:creationId xmlns:a16="http://schemas.microsoft.com/office/drawing/2014/main" id="{13F23E4A-B55C-434F-BE4F-14FF1202AFAE}"/>
+              </a:ext>
+            </a:extLst>
+          </p:cNvPr>
+          <p:cNvSpPr>
+            <a:spLocks noGrp="1"/>
+          </p:cNvSpPr>
+          <p:nvPr>
+            <p:ph type="title"/>
+          </p:nvPr>
         </p:nvSpPr>
         <p:spPr>
           <a:xfrm>
-            <a:off x="3141343" y="2676798"/>
-            <a:ext cx="2917786" cy="553998"/>
+            <a:off x="628650" y="365127"/>
+            <a:ext cx="7886700" cy="701674"/>
           </a:xfrm>
-          <a:prstGeom prst="rect">
-            <a:avLst/>
-          </a:prstGeom>
         </p:spPr>
         <p:txBody>
-          <a:bodyPr wrap="none">
-            <a:spAutoFit/>
-          </a:bodyPr>
+          <a:bodyPr/>
           <a:lstStyle/>
           <a:p>
             <a:r>
-              <a:rPr lang="en-GB" sz="3000" dirty="0">
+              <a:rPr lang="en-GB" dirty="0">
                 <a:solidFill>
-                  <a:srgbClr val="000000"/>
+                  <a:schemeClr val="bg1"/>
                 </a:solidFill>
-                <a:latin typeface="Arial" panose="020B0604020202020204" pitchFamily="34" charset="0"/>
-                <a:ea typeface="Calibri" panose="020F0502020204030204" pitchFamily="34" charset="0"/>
-                <a:cs typeface="Arial" panose="020B0604020202020204" pitchFamily="34" charset="0"/>
               </a:rPr>
-              <a:t>Any questions? </a:t>
-            </a:r>
-            <a:endParaRPr lang="en-GB" sz="3000" dirty="0">
-              <a:latin typeface="Arial" panose="020B0604020202020204" pitchFamily="34" charset="0"/>
-              <a:ea typeface="Calibri" panose="020F0502020204030204" pitchFamily="34" charset="0"/>
-              <a:cs typeface="Arial" panose="020B0604020202020204" pitchFamily="34" charset="0"/>
+              <a:t>UK Timeline for </a:t>
+            </a:r>
+            <a:r>
+              <a:rPr lang="en-GB" dirty="0" err="1">
+                <a:solidFill>
+                  <a:schemeClr val="bg1"/>
+                </a:solidFill>
+              </a:rPr>
+              <a:t>CyberSec</a:t>
+            </a:r>
+            <a:endParaRPr lang="en-GB" dirty="0">
+              <a:solidFill>
+                <a:schemeClr val="bg1"/>
+              </a:solidFill>
             </a:endParaRPr>
           </a:p>
         </p:txBody>
       </p:sp>
       <p:pic>
         <p:nvPicPr>
-          <p:cNvPr id="6" name="Picture 5"/>
+          <p:cNvPr id="7" name="table">
+            <a:extLst>
+              <a:ext uri="{FF2B5EF4-FFF2-40B4-BE49-F238E27FC236}">
+                <a16:creationId xmlns:a16="http://schemas.microsoft.com/office/drawing/2014/main" id="{1E49FBF7-5195-40DF-B6D4-E75A8A2922A9}"/>
+              </a:ext>
+            </a:extLst>
+          </p:cNvPr>
           <p:cNvPicPr>
-            <a:picLocks noChangeAspect="1"/>
+            <a:picLocks noGrp="1" noChangeAspect="1"/>
           </p:cNvPicPr>
-          <p:nvPr/>
+          <p:nvPr>
+            <p:ph idx="1"/>
+          </p:nvPr>
         </p:nvPicPr>
         <p:blipFill>
-          <a:blip r:embed="rId3">
-            <a:extLst>
-              <a:ext uri="{28A0092B-C50C-407E-A947-70E740481C1C}">
-                <a14:useLocalDpi xmlns:a14="http://schemas.microsoft.com/office/drawing/2010/main" val="0"/>
-              </a:ext>
-            </a:extLst>
-          </a:blip>
+          <a:blip r:embed="rId3"/>
           <a:stretch>
             <a:fillRect/>
           </a:stretch>
         </p:blipFill>
         <p:spPr>
           <a:xfrm>
-            <a:off x="528576" y="5560005"/>
-            <a:ext cx="2197372" cy="843742"/>
-          </a:xfrm>
-          <a:prstGeom prst="rect">
-            <a:avLst/>
-          </a:prstGeom>
-        </p:spPr>
-      </p:pic>
-      <p:pic>
-        <p:nvPicPr>
-          <p:cNvPr id="7" name="Picture 6"/>
-          <p:cNvPicPr>
-            <a:picLocks noChangeAspect="1"/>
-          </p:cNvPicPr>
-          <p:nvPr/>
-        </p:nvPicPr>
-        <p:blipFill>
-          <a:blip r:embed="rId4"/>
-          <a:stretch>
-            <a:fillRect/>
-          </a:stretch>
-        </p:blipFill>
-        <p:spPr>
-          <a:xfrm>
-            <a:off x="5830206" y="5606682"/>
-            <a:ext cx="2615054" cy="871684"/>
+            <a:off x="29603" y="1247775"/>
+            <a:ext cx="9034340" cy="5400676"/>
           </a:xfrm>
           <a:prstGeom prst="rect">
             <a:avLst/>
@@ -5313,7 +6127,7 @@
     </p:spTree>
     <p:extLst>
       <p:ext uri="{BB962C8B-B14F-4D97-AF65-F5344CB8AC3E}">
-        <p14:creationId xmlns:p14="http://schemas.microsoft.com/office/powerpoint/2010/main" val="1884598785"/>
+        <p14:creationId xmlns:p14="http://schemas.microsoft.com/office/powerpoint/2010/main" val="4131052727"/>
       </p:ext>
     </p:extLst>
   </p:cSld>
@@ -5438,7 +6252,7 @@
           <p:cNvPr id="5" name="Title 4">
             <a:extLst>
               <a:ext uri="{FF2B5EF4-FFF2-40B4-BE49-F238E27FC236}">
-                <a16:creationId xmlns:a16="http://schemas.microsoft.com/office/drawing/2014/main" id="{08C64A66-0920-4768-9C91-A9A7C4A806F1}"/>
+                <a16:creationId xmlns:a16="http://schemas.microsoft.com/office/drawing/2014/main" id="{6CC60C85-5362-4985-85B9-7DE1290B9B0A}"/>
               </a:ext>
             </a:extLst>
           </p:cNvPr>
@@ -5451,14 +6265,12 @@
         </p:nvSpPr>
         <p:spPr>
           <a:xfrm>
-            <a:off x="628650" y="365126"/>
-            <a:ext cx="7886700" cy="692150"/>
+            <a:off x="628650" y="365127"/>
+            <a:ext cx="7886700" cy="739774"/>
           </a:xfrm>
         </p:spPr>
         <p:txBody>
-          <a:bodyPr>
-            <a:normAutofit fontScale="90000"/>
-          </a:bodyPr>
+          <a:bodyPr/>
           <a:lstStyle/>
           <a:p>
             <a:r>
@@ -5467,7 +6279,7 @@
                   <a:schemeClr val="bg1"/>
                 </a:solidFill>
               </a:rPr>
-              <a:t>References</a:t>
+              <a:t>Curricula guidelines (2015)</a:t>
             </a:r>
           </a:p>
         </p:txBody>
@@ -5477,7 +6289,7 @@
           <p:cNvPr id="6" name="Content Placeholder 5">
             <a:extLst>
               <a:ext uri="{FF2B5EF4-FFF2-40B4-BE49-F238E27FC236}">
-                <a16:creationId xmlns:a16="http://schemas.microsoft.com/office/drawing/2014/main" id="{B6D5D2CF-4CAE-4C0A-851A-3F7AD59C7EF2}"/>
+                <a16:creationId xmlns:a16="http://schemas.microsoft.com/office/drawing/2014/main" id="{8967C89F-4F31-4FCB-9894-353538A06252}"/>
               </a:ext>
             </a:extLst>
           </p:cNvPr>
@@ -5488,168 +6300,353 @@
             <p:ph idx="1"/>
           </p:nvPr>
         </p:nvSpPr>
-        <p:spPr>
-          <a:xfrm>
-            <a:off x="628650" y="985426"/>
-            <a:ext cx="7886700" cy="5191537"/>
-          </a:xfrm>
-        </p:spPr>
-        <p:txBody>
-          <a:bodyPr>
-            <a:noAutofit/>
-          </a:bodyPr>
+        <p:spPr/>
+        <p:txBody>
+          <a:bodyPr/>
           <a:lstStyle/>
           <a:p>
             <a:pPr marL="0" indent="0">
-              <a:buNone/>
+              <a:buFont typeface="Times" panose="02020603050405020304" pitchFamily="18" charset="0"/>
+              <a:buNone/>
+              <a:defRPr/>
             </a:pPr>
             <a:r>
-              <a:rPr lang="en-GB" sz="2000" dirty="0"/>
-              <a:t>[1] Cynthia Taylor and </a:t>
-            </a:r>
-            <a:r>
-              <a:rPr lang="en-GB" sz="2000" dirty="0" err="1"/>
-              <a:t>Saheel</a:t>
-            </a:r>
-            <a:r>
-              <a:rPr lang="en-GB" sz="2000" dirty="0"/>
-              <a:t> </a:t>
-            </a:r>
-            <a:r>
-              <a:rPr lang="en-GB" sz="2000" dirty="0" err="1"/>
-              <a:t>Sakharkar</a:t>
-            </a:r>
-            <a:r>
-              <a:rPr lang="en-GB" sz="2000" dirty="0"/>
-              <a:t>. ';DROP TABLE textbooks; ― An Argument for SQL Injection Coverage in Database Textbooks. In Proc. of SIGCSE 2019, pages 191-197, 2019.</a:t>
+              <a:rPr lang="en-GB" sz="3200" dirty="0"/>
+              <a:t>Coverage is mandated of:</a:t>
+            </a:r>
+          </a:p>
+          <a:p>
+            <a:pPr>
+              <a:defRPr/>
+            </a:pPr>
+            <a:r>
+              <a:rPr lang="en-GB" dirty="0"/>
+              <a:t>Information and risk</a:t>
+            </a:r>
+          </a:p>
+          <a:p>
+            <a:pPr>
+              <a:defRPr/>
+            </a:pPr>
+            <a:r>
+              <a:rPr lang="en-GB" dirty="0"/>
+              <a:t>Threats and attacks</a:t>
+            </a:r>
+          </a:p>
+          <a:p>
+            <a:pPr>
+              <a:defRPr/>
+            </a:pPr>
+            <a:r>
+              <a:rPr lang="en-GB" dirty="0"/>
+              <a:t>Cybersecurity architecture and operations</a:t>
+            </a:r>
+          </a:p>
+          <a:p>
+            <a:pPr>
+              <a:defRPr/>
+            </a:pPr>
+            <a:r>
+              <a:rPr lang="en-GB" dirty="0"/>
+              <a:t>Secure systems and products</a:t>
+            </a:r>
+          </a:p>
+          <a:p>
+            <a:pPr>
+              <a:defRPr/>
+            </a:pPr>
+            <a:r>
+              <a:rPr lang="en-GB" dirty="0"/>
+              <a:t>Cybersecurity management.</a:t>
             </a:r>
           </a:p>
           <a:p>
             <a:pPr marL="0" indent="0">
               <a:buNone/>
+              <a:defRPr/>
             </a:pPr>
             <a:r>
-              <a:rPr lang="en-GB" sz="2000" dirty="0"/>
-              <a:t>[2] N. Meng, S. Nagy, D. Yao, W. Zhuang, and G. Arango </a:t>
-            </a:r>
-            <a:r>
-              <a:rPr lang="en-GB" sz="2000" dirty="0" err="1"/>
-              <a:t>Argoty</a:t>
-            </a:r>
-            <a:r>
-              <a:rPr lang="en-GB" sz="2000" dirty="0"/>
-              <a:t>. Secure coding practices in Java: Challenges and vulnerabilities. In IEEE/ACM 40th Int. Conf. on Software Engineering, pages 372-383, 2018.</a:t>
+              <a:rPr lang="en-GB" dirty="0"/>
+              <a:t>In the light of our findings, where should this go?</a:t>
             </a:r>
           </a:p>
           <a:p>
             <a:pPr marL="0" indent="0">
               <a:buNone/>
             </a:pPr>
-            <a:r>
-              <a:rPr lang="en-GB" sz="2000" dirty="0"/>
-              <a:t>[3] F. Fischer, K. </a:t>
-            </a:r>
-            <a:r>
-              <a:rPr lang="en-GB" sz="2000" dirty="0" err="1"/>
-              <a:t>Böttinger</a:t>
-            </a:r>
-            <a:r>
-              <a:rPr lang="en-GB" sz="2000" dirty="0"/>
-              <a:t>, H. Xiao, C. </a:t>
-            </a:r>
-            <a:r>
-              <a:rPr lang="en-GB" sz="2000" dirty="0" err="1"/>
-              <a:t>Stransky</a:t>
-            </a:r>
-            <a:r>
-              <a:rPr lang="en-GB" sz="2000" dirty="0"/>
-              <a:t>, Y. </a:t>
-            </a:r>
-            <a:r>
-              <a:rPr lang="en-GB" sz="2000" dirty="0" err="1"/>
-              <a:t>Acar</a:t>
-            </a:r>
-            <a:r>
-              <a:rPr lang="en-GB" sz="2000" dirty="0"/>
-              <a:t>, M. Backes, and S. </a:t>
-            </a:r>
-            <a:r>
-              <a:rPr lang="en-GB" sz="2000" dirty="0" err="1"/>
-              <a:t>Fahl</a:t>
-            </a:r>
-            <a:r>
-              <a:rPr lang="en-GB" sz="2000" dirty="0"/>
-              <a:t>. Stack Overflow Considered Harmful? The Impact of </a:t>
-            </a:r>
-            <a:r>
-              <a:rPr lang="en-GB" sz="2000" dirty="0" err="1"/>
-              <a:t>Copy&amp;Paste</a:t>
-            </a:r>
-            <a:r>
-              <a:rPr lang="en-GB" sz="2000" dirty="0"/>
-              <a:t> on Android Application Security. In 38th IEEE Symposium on Security and Privacy, pages 121-136, 2017.</a:t>
-            </a:r>
-          </a:p>
-          <a:p>
-            <a:pPr marL="0" indent="0">
-              <a:buNone/>
-            </a:pPr>
-            <a:r>
-              <a:rPr lang="en-GB" sz="2000" dirty="0"/>
-              <a:t>[4] T. Unruh, B. </a:t>
-            </a:r>
-            <a:r>
-              <a:rPr lang="en-GB" sz="2000" dirty="0" err="1"/>
-              <a:t>Shastry</a:t>
-            </a:r>
-            <a:r>
-              <a:rPr lang="en-GB" sz="2000" dirty="0"/>
-              <a:t>, M. </a:t>
-            </a:r>
-            <a:r>
-              <a:rPr lang="en-GB" sz="2000" dirty="0" err="1"/>
-              <a:t>Skoruppa</a:t>
-            </a:r>
-            <a:r>
-              <a:rPr lang="en-GB" sz="2000" dirty="0"/>
-              <a:t>, F. Maggi, K. </a:t>
-            </a:r>
-            <a:r>
-              <a:rPr lang="en-GB" sz="2000" dirty="0" err="1"/>
-              <a:t>Rieck</a:t>
-            </a:r>
-            <a:r>
-              <a:rPr lang="en-GB" sz="2000" dirty="0"/>
-              <a:t>, J.-P. Seifert, and F. Yamaguchi. Leveraging Flawed Tutorials for Seeding Large-Scale Web Vulnerability Discovery. In Proc. of 11th USENIX Workshop on Offensive Technologies (WOOT 2017), 2017.</a:t>
-            </a:r>
-          </a:p>
-          <a:p>
-            <a:pPr marL="0" indent="0">
-              <a:buNone/>
-            </a:pPr>
-            <a:r>
-              <a:rPr lang="en-GB" sz="2000" dirty="0"/>
-              <a:t>[5] Alastair Irons, Nick Savage, Carsten Maple, Adrian Davies, and Lyndsay Turley. Cybersecurity in CS Degrees</a:t>
-            </a:r>
-            <a:r>
-              <a:rPr lang="en-GB" sz="2000" i="1" dirty="0"/>
-              <a:t>. </a:t>
-            </a:r>
-            <a:r>
-              <a:rPr lang="en-GB" sz="2000" i="1" dirty="0" err="1"/>
-              <a:t>ITNow</a:t>
-            </a:r>
-            <a:r>
-              <a:rPr lang="en-GB" sz="2000" dirty="0"/>
-              <a:t>, 58:56-57, 2016.</a:t>
-            </a:r>
+            <a:endParaRPr lang="en-GB" dirty="0"/>
           </a:p>
         </p:txBody>
       </p:sp>
     </p:spTree>
     <p:extLst>
       <p:ext uri="{BB962C8B-B14F-4D97-AF65-F5344CB8AC3E}">
-        <p14:creationId xmlns:p14="http://schemas.microsoft.com/office/powerpoint/2010/main" val="118011086"/>
+        <p14:creationId xmlns:p14="http://schemas.microsoft.com/office/powerpoint/2010/main" val="370231595"/>
+      </p:ext>
+    </p:extLst>
+  </p:cSld>
+  <p:clrMapOvr>
+    <a:masterClrMapping/>
+  </p:clrMapOvr>
+</p:sld>
+</file>
+
+<file path=ppt/slides/slide9.xml><?xml version="1.0" encoding="utf-8"?>
+<p:sld xmlns:a="http://schemas.openxmlformats.org/drawingml/2006/main" xmlns:r="http://schemas.openxmlformats.org/officeDocument/2006/relationships" xmlns:p="http://schemas.openxmlformats.org/presentationml/2006/main">
+  <p:cSld>
+    <p:spTree>
+      <p:nvGrpSpPr>
+        <p:cNvPr id="1" name=""/>
+        <p:cNvGrpSpPr/>
+        <p:nvPr/>
+      </p:nvGrpSpPr>
+      <p:grpSpPr>
+        <a:xfrm>
+          <a:off x="0" y="0"/>
+          <a:ext cx="0" cy="0"/>
+          <a:chOff x="0" y="0"/>
+          <a:chExt cx="0" cy="0"/>
+        </a:xfrm>
+      </p:grpSpPr>
+      <p:grpSp>
+        <p:nvGrpSpPr>
+          <p:cNvPr id="2" name="Group 1"/>
+          <p:cNvGrpSpPr/>
+          <p:nvPr/>
+        </p:nvGrpSpPr>
+        <p:grpSpPr>
+          <a:xfrm>
+            <a:off x="60385" y="448286"/>
+            <a:ext cx="8876764" cy="453980"/>
+            <a:chOff x="-115910" y="386367"/>
+            <a:chExt cx="11835685" cy="605307"/>
+          </a:xfrm>
+          <a:solidFill>
+            <a:srgbClr val="0C2738"/>
+          </a:solidFill>
+        </p:grpSpPr>
+        <p:sp>
+          <p:nvSpPr>
+            <p:cNvPr id="3" name="Round Single Corner Rectangle 2"/>
+            <p:cNvSpPr/>
+            <p:nvPr/>
+          </p:nvSpPr>
+          <p:spPr>
+            <a:xfrm>
+              <a:off x="-115910" y="386367"/>
+              <a:ext cx="11835685" cy="605307"/>
+            </a:xfrm>
+            <a:prstGeom prst="round1Rect">
+              <a:avLst/>
+            </a:prstGeom>
+            <a:grpFill/>
+            <a:ln>
+              <a:noFill/>
+            </a:ln>
+          </p:spPr>
+          <p:style>
+            <a:lnRef idx="2">
+              <a:schemeClr val="accent1">
+                <a:shade val="50000"/>
+              </a:schemeClr>
+            </a:lnRef>
+            <a:fillRef idx="1">
+              <a:schemeClr val="accent1"/>
+            </a:fillRef>
+            <a:effectRef idx="0">
+              <a:schemeClr val="accent1"/>
+            </a:effectRef>
+            <a:fontRef idx="minor">
+              <a:schemeClr val="lt1"/>
+            </a:fontRef>
+          </p:style>
+          <p:txBody>
+            <a:bodyPr rtlCol="0" anchor="ctr"/>
+            <a:lstStyle/>
+            <a:p>
+              <a:pPr algn="ctr"/>
+              <a:endParaRPr lang="en-GB" sz="1350"/>
+            </a:p>
+          </p:txBody>
+        </p:sp>
+        <p:pic>
+          <p:nvPicPr>
+            <p:cNvPr id="4" name="Picture 3"/>
+            <p:cNvPicPr>
+              <a:picLocks noChangeAspect="1"/>
+            </p:cNvPicPr>
+            <p:nvPr/>
+          </p:nvPicPr>
+          <p:blipFill>
+            <a:blip r:embed="rId2" cstate="print">
+              <a:extLst>
+                <a:ext uri="{28A0092B-C50C-407E-A947-70E740481C1C}">
+                  <a14:useLocalDpi xmlns:a14="http://schemas.microsoft.com/office/drawing/2010/main" val="0"/>
+                </a:ext>
+              </a:extLst>
+            </a:blip>
+            <a:stretch>
+              <a:fillRect/>
+            </a:stretch>
+          </p:blipFill>
+          <p:spPr>
+            <a:xfrm>
+              <a:off x="9710730" y="425004"/>
+              <a:ext cx="1918893" cy="496430"/>
+            </a:xfrm>
+            <a:prstGeom prst="rect">
+              <a:avLst/>
+            </a:prstGeom>
+            <a:grpFill/>
+          </p:spPr>
+        </p:pic>
+      </p:grpSp>
+      <p:sp>
+        <p:nvSpPr>
+          <p:cNvPr id="5" name="Title 4">
+            <a:extLst>
+              <a:ext uri="{FF2B5EF4-FFF2-40B4-BE49-F238E27FC236}">
+                <a16:creationId xmlns:a16="http://schemas.microsoft.com/office/drawing/2014/main" id="{CDDD41CC-14FD-432A-81C4-1AB9ECBD036C}"/>
+              </a:ext>
+            </a:extLst>
+          </p:cNvPr>
+          <p:cNvSpPr>
+            <a:spLocks noGrp="1"/>
+          </p:cNvSpPr>
+          <p:nvPr>
+            <p:ph type="title"/>
+          </p:nvPr>
+        </p:nvSpPr>
+        <p:spPr>
+          <a:xfrm>
+            <a:off x="628650" y="365127"/>
+            <a:ext cx="7886700" cy="625473"/>
+          </a:xfrm>
+        </p:spPr>
+        <p:txBody>
+          <a:bodyPr>
+            <a:normAutofit fontScale="90000"/>
+          </a:bodyPr>
+          <a:lstStyle/>
+          <a:p>
+            <a:r>
+              <a:rPr lang="en-GB" dirty="0">
+                <a:solidFill>
+                  <a:schemeClr val="bg1"/>
+                </a:solidFill>
+              </a:rPr>
+              <a:t>Timeline for implementation </a:t>
+            </a:r>
+          </a:p>
+        </p:txBody>
+      </p:sp>
+      <p:sp>
+        <p:nvSpPr>
+          <p:cNvPr id="6" name="Content Placeholder 5">
+            <a:extLst>
+              <a:ext uri="{FF2B5EF4-FFF2-40B4-BE49-F238E27FC236}">
+                <a16:creationId xmlns:a16="http://schemas.microsoft.com/office/drawing/2014/main" id="{FE82F654-90CD-4BD2-ABED-055A46ACA720}"/>
+              </a:ext>
+            </a:extLst>
+          </p:cNvPr>
+          <p:cNvSpPr>
+            <a:spLocks noGrp="1"/>
+          </p:cNvSpPr>
+          <p:nvPr>
+            <p:ph idx="1"/>
+          </p:nvPr>
+        </p:nvSpPr>
+        <p:spPr/>
+        <p:txBody>
+          <a:bodyPr>
+            <a:normAutofit fontScale="92500" lnSpcReduction="10000"/>
+          </a:bodyPr>
+          <a:lstStyle/>
+          <a:p>
+            <a:pPr marL="0" indent="0">
+              <a:buNone/>
+            </a:pPr>
+            <a:r>
+              <a:rPr lang="en-US" dirty="0">
+                <a:solidFill>
+                  <a:schemeClr val="dk1"/>
+                </a:solidFill>
+              </a:rPr>
+              <a:t>Cybersecurity Principles Roadshow: March-April 2016</a:t>
+            </a:r>
+            <a:endParaRPr lang="en-GB" dirty="0">
+              <a:solidFill>
+                <a:schemeClr val="dk1"/>
+              </a:solidFill>
+            </a:endParaRPr>
+          </a:p>
+          <a:p>
+            <a:pPr marL="0" indent="0">
+              <a:buNone/>
+            </a:pPr>
+            <a:r>
+              <a:rPr lang="en-GB" dirty="0"/>
+              <a:t>All institutions expected to be fully compliant: Sept 2020</a:t>
+            </a:r>
+          </a:p>
+          <a:p>
+            <a:pPr marL="0" indent="0">
+              <a:buNone/>
+            </a:pPr>
+            <a:endParaRPr lang="en-GB" dirty="0"/>
+          </a:p>
+          <a:p>
+            <a:pPr marL="0" indent="0">
+              <a:buNone/>
+            </a:pPr>
+            <a:r>
+              <a:rPr lang="en-GB" dirty="0"/>
+              <a:t>Status (autumn 2018)</a:t>
+            </a:r>
+          </a:p>
+          <a:p>
+            <a:r>
+              <a:rPr lang="en-US" altLang="en-US" dirty="0"/>
+              <a:t>70 Higher Education Institutes visited under this regime</a:t>
+            </a:r>
+          </a:p>
+          <a:p>
+            <a:r>
+              <a:rPr lang="en-US" altLang="en-US" dirty="0"/>
+              <a:t>54 Higher Education Institutes compliant</a:t>
+            </a:r>
+          </a:p>
+          <a:p>
+            <a:r>
+              <a:rPr lang="en-US" altLang="en-US" dirty="0"/>
+              <a:t>12 Higher Education Institutes requiring long actions (for next visit)</a:t>
+            </a:r>
+          </a:p>
+          <a:p>
+            <a:r>
+              <a:rPr lang="en-US" altLang="en-US" dirty="0"/>
+              <a:t>4 Higher Education Institutes requiring short term actions</a:t>
+            </a:r>
+            <a:endParaRPr lang="en-GB" altLang="en-US" dirty="0"/>
+          </a:p>
+          <a:p>
+            <a:pPr marL="0" indent="0">
+              <a:buNone/>
+            </a:pPr>
+            <a:endParaRPr lang="en-GB" dirty="0"/>
+          </a:p>
+          <a:p>
+            <a:pPr marL="0" indent="0">
+              <a:buNone/>
+            </a:pPr>
+            <a:endParaRPr lang="en-GB" dirty="0"/>
+          </a:p>
+        </p:txBody>
+      </p:sp>
+    </p:spTree>
+    <p:extLst>
+      <p:ext uri="{BB962C8B-B14F-4D97-AF65-F5344CB8AC3E}">
+        <p14:creationId xmlns:p14="http://schemas.microsoft.com/office/powerpoint/2010/main" val="3131741793"/>
       </p:ext>
     </p:extLst>
   </p:cSld>

</xml_diff>